<commit_message>
Deploy website Wed Jul  3 02:27:13 PM PDT 2024
</commit_message>
<xml_diff>
--- a/assets/slides/su24/10-ADTs.pptx
+++ b/assets/slides/su24/10-ADTs.pptx
@@ -72,14 +72,14 @@
       <p:italic r:id="rId52"/>
     </p:embeddedFont>
     <p:embeddedFont>
-      <p:font typeface="FreightMicro Pro Light"/>
+      <p:font typeface="FreightMicro Pro Light" panose="020B0604020202020204" charset="0"/>
       <p:regular r:id="rId53"/>
       <p:bold r:id="rId54"/>
       <p:italic r:id="rId55"/>
       <p:boldItalic r:id="rId56"/>
     </p:embeddedFont>
     <p:embeddedFont>
-      <p:font typeface="FreightMicro Pro Medium" panose="02000603020000020004"/>
+      <p:font typeface="FreightMicro Pro Medium" panose="020B0604020202020204" charset="0"/>
       <p:regular r:id="rId57"/>
       <p:bold r:id="rId58"/>
       <p:italic r:id="rId59"/>
@@ -1677,14 +1677,14 @@
           <a:ln/>
           <a:extLst>
             <a:ext uri="{909E8E84-426E-40dd-AFC4-6F175D3DCCD1}">
-              <a14:hiddenFill xmlns="" xmlns:a14="http://schemas.microsoft.com/office/drawing/2010/main">
+              <a14:hiddenFill xmlns:a14="http://schemas.microsoft.com/office/drawing/2010/main" xmlns="">
                 <a:solidFill>
                   <a:srgbClr val="FFFFFF"/>
                 </a:solidFill>
               </a14:hiddenFill>
             </a:ext>
             <a:ext uri="{91240B29-F687-4f45-9708-019B960494DF}">
-              <a14:hiddenLine xmlns="" xmlns:a14="http://schemas.microsoft.com/office/drawing/2010/main" w="9525">
+              <a14:hiddenLine xmlns:a14="http://schemas.microsoft.com/office/drawing/2010/main" xmlns="" w="9525">
                 <a:solidFill>
                   <a:srgbClr val="000000"/>
                 </a:solidFill>
@@ -1852,14 +1852,14 @@
           <a:ln/>
           <a:extLst>
             <a:ext uri="{909E8E84-426E-40dd-AFC4-6F175D3DCCD1}">
-              <a14:hiddenFill xmlns="" xmlns:a14="http://schemas.microsoft.com/office/drawing/2010/main">
+              <a14:hiddenFill xmlns:a14="http://schemas.microsoft.com/office/drawing/2010/main" xmlns="">
                 <a:solidFill>
                   <a:srgbClr val="FFFFFF"/>
                 </a:solidFill>
               </a14:hiddenFill>
             </a:ext>
             <a:ext uri="{91240B29-F687-4f45-9708-019B960494DF}">
-              <a14:hiddenLine xmlns="" xmlns:a14="http://schemas.microsoft.com/office/drawing/2010/main" w="9525">
+              <a14:hiddenLine xmlns:a14="http://schemas.microsoft.com/office/drawing/2010/main" xmlns="" w="9525">
                 <a:solidFill>
                   <a:srgbClr val="000000"/>
                 </a:solidFill>
@@ -1869,7 +1869,7 @@
               </a14:hiddenLine>
             </a:ext>
             <a:ext uri="{FAA26D3D-D897-4be2-8F04-BA451C77F1D7}">
-              <ma14:placeholderFlag xmlns="" xmlns:ma14="http://schemas.microsoft.com/office/mac/drawingml/2011/main" val="1"/>
+              <ma14:placeholderFlag xmlns:ma14="http://schemas.microsoft.com/office/mac/drawingml/2011/main" xmlns="" val="1"/>
             </a:ext>
           </a:extLst>
         </p:spPr>
@@ -2270,14 +2270,14 @@
           <a:ln/>
           <a:extLst>
             <a:ext uri="{909E8E84-426E-40dd-AFC4-6F175D3DCCD1}">
-              <a14:hiddenFill xmlns="" xmlns:a14="http://schemas.microsoft.com/office/drawing/2010/main">
+              <a14:hiddenFill xmlns:a14="http://schemas.microsoft.com/office/drawing/2010/main" xmlns="">
                 <a:solidFill>
                   <a:srgbClr val="FFFFFF"/>
                 </a:solidFill>
               </a14:hiddenFill>
             </a:ext>
             <a:ext uri="{91240B29-F687-4f45-9708-019B960494DF}">
-              <a14:hiddenLine xmlns="" xmlns:a14="http://schemas.microsoft.com/office/drawing/2010/main" w="9525">
+              <a14:hiddenLine xmlns:a14="http://schemas.microsoft.com/office/drawing/2010/main" xmlns="" w="9525">
                 <a:solidFill>
                   <a:srgbClr val="000000"/>
                 </a:solidFill>
@@ -2445,14 +2445,14 @@
           <a:ln/>
           <a:extLst>
             <a:ext uri="{909E8E84-426E-40dd-AFC4-6F175D3DCCD1}">
-              <a14:hiddenFill xmlns="" xmlns:a14="http://schemas.microsoft.com/office/drawing/2010/main">
+              <a14:hiddenFill xmlns:a14="http://schemas.microsoft.com/office/drawing/2010/main" xmlns="">
                 <a:solidFill>
                   <a:srgbClr val="FFFFFF"/>
                 </a:solidFill>
               </a14:hiddenFill>
             </a:ext>
             <a:ext uri="{91240B29-F687-4f45-9708-019B960494DF}">
-              <a14:hiddenLine xmlns="" xmlns:a14="http://schemas.microsoft.com/office/drawing/2010/main" w="9525">
+              <a14:hiddenLine xmlns:a14="http://schemas.microsoft.com/office/drawing/2010/main" xmlns="" w="9525">
                 <a:solidFill>
                   <a:srgbClr val="000000"/>
                 </a:solidFill>
@@ -2462,7 +2462,7 @@
               </a14:hiddenLine>
             </a:ext>
             <a:ext uri="{FAA26D3D-D897-4be2-8F04-BA451C77F1D7}">
-              <ma14:placeholderFlag xmlns="" xmlns:ma14="http://schemas.microsoft.com/office/mac/drawingml/2011/main" val="1"/>
+              <ma14:placeholderFlag xmlns:ma14="http://schemas.microsoft.com/office/mac/drawingml/2011/main" xmlns="" val="1"/>
             </a:ext>
           </a:extLst>
         </p:spPr>
@@ -2633,14 +2633,14 @@
           <a:ln/>
           <a:extLst>
             <a:ext uri="{909E8E84-426E-40dd-AFC4-6F175D3DCCD1}">
-              <a14:hiddenFill xmlns="" xmlns:a14="http://schemas.microsoft.com/office/drawing/2010/main">
+              <a14:hiddenFill xmlns:a14="http://schemas.microsoft.com/office/drawing/2010/main" xmlns="">
                 <a:solidFill>
                   <a:srgbClr val="FFFFFF"/>
                 </a:solidFill>
               </a14:hiddenFill>
             </a:ext>
             <a:ext uri="{91240B29-F687-4f45-9708-019B960494DF}">
-              <a14:hiddenLine xmlns="" xmlns:a14="http://schemas.microsoft.com/office/drawing/2010/main" w="9525">
+              <a14:hiddenLine xmlns:a14="http://schemas.microsoft.com/office/drawing/2010/main" xmlns="" w="9525">
                 <a:solidFill>
                   <a:srgbClr val="000000"/>
                 </a:solidFill>
@@ -2808,14 +2808,14 @@
           <a:ln/>
           <a:extLst>
             <a:ext uri="{909E8E84-426E-40dd-AFC4-6F175D3DCCD1}">
-              <a14:hiddenFill xmlns="" xmlns:a14="http://schemas.microsoft.com/office/drawing/2010/main">
+              <a14:hiddenFill xmlns:a14="http://schemas.microsoft.com/office/drawing/2010/main" xmlns="">
                 <a:solidFill>
                   <a:srgbClr val="FFFFFF"/>
                 </a:solidFill>
               </a14:hiddenFill>
             </a:ext>
             <a:ext uri="{91240B29-F687-4f45-9708-019B960494DF}">
-              <a14:hiddenLine xmlns="" xmlns:a14="http://schemas.microsoft.com/office/drawing/2010/main" w="9525">
+              <a14:hiddenLine xmlns:a14="http://schemas.microsoft.com/office/drawing/2010/main" xmlns="" w="9525">
                 <a:solidFill>
                   <a:srgbClr val="000000"/>
                 </a:solidFill>
@@ -2825,7 +2825,7 @@
               </a14:hiddenLine>
             </a:ext>
             <a:ext uri="{FAA26D3D-D897-4be2-8F04-BA451C77F1D7}">
-              <ma14:placeholderFlag xmlns="" xmlns:ma14="http://schemas.microsoft.com/office/mac/drawingml/2011/main" val="1"/>
+              <ma14:placeholderFlag xmlns:ma14="http://schemas.microsoft.com/office/mac/drawingml/2011/main" xmlns="" val="1"/>
             </a:ext>
           </a:extLst>
         </p:spPr>
@@ -6160,7 +6160,7 @@
           </a:ln>
           <a:extLst>
             <a:ext uri="{909E8E84-426E-40dd-AFC4-6F175D3DCCD1}">
-              <a14:hiddenFill xmlns="" xmlns:a14="http://schemas.microsoft.com/office/drawing/2010/main">
+              <a14:hiddenFill xmlns:a14="http://schemas.microsoft.com/office/drawing/2010/main" xmlns="">
                 <a:noFill/>
               </a14:hiddenFill>
             </a:ext>
@@ -6282,14 +6282,14 @@
           </a:ln>
           <a:extLst>
             <a:ext uri="{909E8E84-426E-40dd-AFC4-6F175D3DCCD1}">
-              <a14:hiddenFill xmlns="" xmlns:a14="http://schemas.microsoft.com/office/drawing/2010/main">
+              <a14:hiddenFill xmlns:a14="http://schemas.microsoft.com/office/drawing/2010/main" xmlns="">
                 <a:solidFill>
                   <a:srgbClr val="FFFFFF"/>
                 </a:solidFill>
               </a14:hiddenFill>
             </a:ext>
             <a:ext uri="{91240B29-F687-4f45-9708-019B960494DF}">
-              <a14:hiddenLine xmlns="" xmlns:a14="http://schemas.microsoft.com/office/drawing/2010/main" w="9525">
+              <a14:hiddenLine xmlns:a14="http://schemas.microsoft.com/office/drawing/2010/main" xmlns="" w="9525">
                 <a:solidFill>
                   <a:srgbClr val="000000"/>
                 </a:solidFill>
@@ -6299,7 +6299,7 @@
               </a14:hiddenLine>
             </a:ext>
             <a:ext uri="{FAA26D3D-D897-4be2-8F04-BA451C77F1D7}">
-              <ma14:placeholderFlag xmlns="" xmlns:ma14="http://schemas.microsoft.com/office/mac/drawingml/2011/main" val="1"/>
+              <ma14:placeholderFlag xmlns:ma14="http://schemas.microsoft.com/office/mac/drawingml/2011/main" xmlns="" val="1"/>
             </a:ext>
           </a:extLst>
         </p:spPr>
@@ -6857,7 +6857,7 @@
           </a:ln>
           <a:extLst>
             <a:ext uri="{909E8E84-426E-40dd-AFC4-6F175D3DCCD1}">
-              <a14:hiddenFill xmlns="" xmlns:a14="http://schemas.microsoft.com/office/drawing/2010/main">
+              <a14:hiddenFill xmlns:a14="http://schemas.microsoft.com/office/drawing/2010/main" xmlns="">
                 <a:noFill/>
               </a14:hiddenFill>
             </a:ext>
@@ -6902,14 +6902,14 @@
           </a:ln>
           <a:extLst>
             <a:ext uri="{909E8E84-426E-40dd-AFC4-6F175D3DCCD1}">
-              <a14:hiddenFill xmlns="" xmlns:a14="http://schemas.microsoft.com/office/drawing/2010/main">
+              <a14:hiddenFill xmlns:a14="http://schemas.microsoft.com/office/drawing/2010/main" xmlns="">
                 <a:solidFill>
                   <a:srgbClr val="FFFFFF"/>
                 </a:solidFill>
               </a14:hiddenFill>
             </a:ext>
             <a:ext uri="{91240B29-F687-4f45-9708-019B960494DF}">
-              <a14:hiddenLine xmlns="" xmlns:a14="http://schemas.microsoft.com/office/drawing/2010/main" w="9525">
+              <a14:hiddenLine xmlns:a14="http://schemas.microsoft.com/office/drawing/2010/main" xmlns="" w="9525">
                 <a:solidFill>
                   <a:srgbClr val="000000"/>
                 </a:solidFill>
@@ -7017,14 +7017,14 @@
           </a:ln>
           <a:extLst>
             <a:ext uri="{909E8E84-426E-40dd-AFC4-6F175D3DCCD1}">
-              <a14:hiddenFill xmlns="" xmlns:a14="http://schemas.microsoft.com/office/drawing/2010/main">
+              <a14:hiddenFill xmlns:a14="http://schemas.microsoft.com/office/drawing/2010/main" xmlns="">
                 <a:solidFill>
                   <a:srgbClr val="FFFFFF"/>
                 </a:solidFill>
               </a14:hiddenFill>
             </a:ext>
             <a:ext uri="{91240B29-F687-4f45-9708-019B960494DF}">
-              <a14:hiddenLine xmlns="" xmlns:a14="http://schemas.microsoft.com/office/drawing/2010/main" w="9525">
+              <a14:hiddenLine xmlns:a14="http://schemas.microsoft.com/office/drawing/2010/main" xmlns="" w="9525">
                 <a:solidFill>
                   <a:srgbClr val="000000"/>
                 </a:solidFill>
@@ -7034,7 +7034,7 @@
               </a14:hiddenLine>
             </a:ext>
             <a:ext uri="{FAA26D3D-D897-4be2-8F04-BA451C77F1D7}">
-              <ma14:placeholderFlag xmlns="" xmlns:ma14="http://schemas.microsoft.com/office/mac/drawingml/2011/main" val="1"/>
+              <ma14:placeholderFlag xmlns:ma14="http://schemas.microsoft.com/office/mac/drawingml/2011/main" xmlns="" val="1"/>
             </a:ext>
           </a:extLst>
         </p:spPr>
@@ -7382,14 +7382,14 @@
           </a:ln>
           <a:extLst>
             <a:ext uri="{909E8E84-426E-40dd-AFC4-6F175D3DCCD1}">
-              <a14:hiddenFill xmlns="" xmlns:a14="http://schemas.microsoft.com/office/drawing/2010/main">
+              <a14:hiddenFill xmlns:a14="http://schemas.microsoft.com/office/drawing/2010/main" xmlns="">
                 <a:solidFill>
                   <a:srgbClr val="FFFFFF"/>
                 </a:solidFill>
               </a14:hiddenFill>
             </a:ext>
             <a:ext uri="{91240B29-F687-4f45-9708-019B960494DF}">
-              <a14:hiddenLine xmlns="" xmlns:a14="http://schemas.microsoft.com/office/drawing/2010/main" w="9525">
+              <a14:hiddenLine xmlns:a14="http://schemas.microsoft.com/office/drawing/2010/main" xmlns="" w="9525">
                 <a:solidFill>
                   <a:srgbClr val="000000"/>
                 </a:solidFill>
@@ -7399,7 +7399,7 @@
               </a14:hiddenLine>
             </a:ext>
             <a:ext uri="{FAA26D3D-D897-4be2-8F04-BA451C77F1D7}">
-              <ma14:placeholderFlag xmlns="" xmlns:ma14="http://schemas.microsoft.com/office/mac/drawingml/2011/main" val="1"/>
+              <ma14:placeholderFlag xmlns:ma14="http://schemas.microsoft.com/office/mac/drawingml/2011/main" xmlns="" val="1"/>
             </a:ext>
           </a:extLst>
         </p:spPr>
@@ -8460,7 +8460,7 @@
           </a:ln>
           <a:extLst>
             <a:ext uri="{909E8E84-426E-40dd-AFC4-6F175D3DCCD1}">
-              <a14:hiddenFill xmlns:a14="http://schemas.microsoft.com/office/drawing/2010/main" xmlns="">
+              <a14:hiddenFill xmlns="" xmlns:a14="http://schemas.microsoft.com/office/drawing/2010/main">
                 <a:noFill/>
               </a14:hiddenFill>
             </a:ext>
@@ -8585,14 +8585,14 @@
           </a:ln>
           <a:extLst>
             <a:ext uri="{909E8E84-426E-40dd-AFC4-6F175D3DCCD1}">
-              <a14:hiddenFill xmlns:a14="http://schemas.microsoft.com/office/drawing/2010/main" xmlns="">
+              <a14:hiddenFill xmlns="" xmlns:a14="http://schemas.microsoft.com/office/drawing/2010/main">
                 <a:solidFill>
                   <a:srgbClr val="FFFFFF"/>
                 </a:solidFill>
               </a14:hiddenFill>
             </a:ext>
             <a:ext uri="{91240B29-F687-4f45-9708-019B960494DF}">
-              <a14:hiddenLine xmlns:a14="http://schemas.microsoft.com/office/drawing/2010/main" xmlns="" w="9525">
+              <a14:hiddenLine xmlns="" xmlns:a14="http://schemas.microsoft.com/office/drawing/2010/main" w="9525">
                 <a:solidFill>
                   <a:srgbClr val="000000"/>
                 </a:solidFill>
@@ -8602,7 +8602,7 @@
               </a14:hiddenLine>
             </a:ext>
             <a:ext uri="{FAA26D3D-D897-4be2-8F04-BA451C77F1D7}">
-              <ma14:placeholderFlag xmlns:ma14="http://schemas.microsoft.com/office/mac/drawingml/2011/main" xmlns="" val="1"/>
+              <ma14:placeholderFlag xmlns="" xmlns:ma14="http://schemas.microsoft.com/office/mac/drawingml/2011/main" val="1"/>
             </a:ext>
           </a:extLst>
         </p:spPr>
@@ -10745,14 +10745,14 @@
           </a:ln>
           <a:extLst>
             <a:ext uri="{909E8E84-426E-40dd-AFC4-6F175D3DCCD1}">
-              <a14:hiddenFill xmlns:a14="http://schemas.microsoft.com/office/drawing/2010/main" xmlns="">
+              <a14:hiddenFill xmlns="" xmlns:a14="http://schemas.microsoft.com/office/drawing/2010/main">
                 <a:solidFill>
                   <a:srgbClr val="FFFFFF"/>
                 </a:solidFill>
               </a14:hiddenFill>
             </a:ext>
             <a:ext uri="{91240B29-F687-4f45-9708-019B960494DF}">
-              <a14:hiddenLine xmlns:a14="http://schemas.microsoft.com/office/drawing/2010/main" xmlns="" w="9525">
+              <a14:hiddenLine xmlns="" xmlns:a14="http://schemas.microsoft.com/office/drawing/2010/main" w="9525">
                 <a:solidFill>
                   <a:srgbClr val="000000"/>
                 </a:solidFill>
@@ -10762,7 +10762,7 @@
               </a14:hiddenLine>
             </a:ext>
             <a:ext uri="{FAA26D3D-D897-4be2-8F04-BA451C77F1D7}">
-              <ma14:placeholderFlag xmlns:ma14="http://schemas.microsoft.com/office/mac/drawingml/2011/main" xmlns="" val="1"/>
+              <ma14:placeholderFlag xmlns="" xmlns:ma14="http://schemas.microsoft.com/office/mac/drawingml/2011/main" val="1"/>
             </a:ext>
           </a:extLst>
         </p:spPr>
@@ -10807,14 +10807,14 @@
           </a:ln>
           <a:extLst>
             <a:ext uri="{909E8E84-426E-40dd-AFC4-6F175D3DCCD1}">
-              <a14:hiddenFill xmlns:a14="http://schemas.microsoft.com/office/drawing/2010/main" xmlns="">
+              <a14:hiddenFill xmlns="" xmlns:a14="http://schemas.microsoft.com/office/drawing/2010/main">
                 <a:solidFill>
                   <a:srgbClr val="FFFFFF"/>
                 </a:solidFill>
               </a14:hiddenFill>
             </a:ext>
             <a:ext uri="{91240B29-F687-4f45-9708-019B960494DF}">
-              <a14:hiddenLine xmlns:a14="http://schemas.microsoft.com/office/drawing/2010/main" xmlns="" w="9525">
+              <a14:hiddenLine xmlns="" xmlns:a14="http://schemas.microsoft.com/office/drawing/2010/main" w="9525">
                 <a:solidFill>
                   <a:srgbClr val="000000"/>
                 </a:solidFill>
@@ -10824,7 +10824,7 @@
               </a14:hiddenLine>
             </a:ext>
             <a:ext uri="{FAA26D3D-D897-4be2-8F04-BA451C77F1D7}">
-              <ma14:placeholderFlag xmlns:ma14="http://schemas.microsoft.com/office/mac/drawingml/2011/main" xmlns="" val="1"/>
+              <ma14:placeholderFlag xmlns="" xmlns:ma14="http://schemas.microsoft.com/office/mac/drawingml/2011/main" val="1"/>
             </a:ext>
           </a:extLst>
         </p:spPr>
@@ -11487,6 +11487,264 @@
           </a:p>
         </p:txBody>
       </p:sp>
+      <p:sp>
+        <p:nvSpPr>
+          <p:cNvPr id="2" name="Subtitle 5">
+            <a:extLst>
+              <a:ext uri="{FF2B5EF4-FFF2-40B4-BE49-F238E27FC236}">
+                <a16:creationId xmlns:a16="http://schemas.microsoft.com/office/drawing/2014/main" id="{8A08BFFF-F272-0939-1945-DD0E25E21B91}"/>
+              </a:ext>
+            </a:extLst>
+          </p:cNvPr>
+          <p:cNvSpPr txBox="1">
+            <a:spLocks/>
+          </p:cNvSpPr>
+          <p:nvPr/>
+        </p:nvSpPr>
+        <p:spPr bwMode="auto">
+          <a:xfrm>
+            <a:off x="10250061" y="6480337"/>
+            <a:ext cx="1941939" cy="322539"/>
+          </a:xfrm>
+          <a:prstGeom prst="rect">
+            <a:avLst/>
+          </a:prstGeom>
+          <a:noFill/>
+          <a:ln>
+            <a:noFill/>
+          </a:ln>
+          <a:extLst>
+            <a:ext uri="{909E8E84-426E-40dd-AFC4-6F175D3DCCD1}">
+              <a14:hiddenFill xmlns="" xmlns:a14="http://schemas.microsoft.com/office/drawing/2010/main">
+                <a:solidFill>
+                  <a:srgbClr val="FFFFFF"/>
+                </a:solidFill>
+              </a14:hiddenFill>
+            </a:ext>
+            <a:ext uri="{91240B29-F687-4f45-9708-019B960494DF}">
+              <a14:hiddenLine xmlns="" xmlns:a14="http://schemas.microsoft.com/office/drawing/2010/main" w="9525">
+                <a:solidFill>
+                  <a:srgbClr val="000000"/>
+                </a:solidFill>
+                <a:miter lim="800000"/>
+                <a:headEnd/>
+                <a:tailEnd/>
+              </a14:hiddenLine>
+            </a:ext>
+            <a:ext uri="{FAA26D3D-D897-4be2-8F04-BA451C77F1D7}">
+              <ma14:placeholderFlag xmlns="" xmlns:ma14="http://schemas.microsoft.com/office/mac/drawingml/2011/main" val="1"/>
+            </a:ext>
+          </a:extLst>
+        </p:spPr>
+        <p:txBody>
+          <a:bodyPr vert="horz" wrap="square" lIns="92075" tIns="46038" rIns="92075" bIns="46038" numCol="1" anchor="t" anchorCtr="0" compatLnSpc="1">
+            <a:prstTxWarp prst="textNoShape">
+              <a:avLst/>
+            </a:prstTxWarp>
+          </a:bodyPr>
+          <a:lstStyle>
+            <a:lvl1pPr marL="0" indent="0" algn="ctr" rtl="0" eaLnBrk="1" fontAlgn="base" hangingPunct="1">
+              <a:lnSpc>
+                <a:spcPct val="100000"/>
+              </a:lnSpc>
+              <a:spcBef>
+                <a:spcPct val="30000"/>
+              </a:spcBef>
+              <a:spcAft>
+                <a:spcPct val="0"/>
+              </a:spcAft>
+              <a:buSzPct val="85000"/>
+              <a:buFontTx/>
+              <a:buNone/>
+              <a:defRPr sz="3200" b="0" i="0" cap="none" baseline="0">
+                <a:solidFill>
+                  <a:schemeClr val="bg1"/>
+                </a:solidFill>
+                <a:latin typeface="FreightMicro Pro Book" panose="02000603020000020004" pitchFamily="2" charset="0"/>
+                <a:ea typeface="Open Sans Light" panose="020B0606030504020204" pitchFamily="34" charset="0"/>
+                <a:cs typeface="Open Sans Light" panose="020B0606030504020204" pitchFamily="34" charset="0"/>
+              </a:defRPr>
+            </a:lvl1pPr>
+            <a:lvl2pPr marL="289315" indent="-96439" algn="l" rtl="0" eaLnBrk="1" fontAlgn="base" hangingPunct="1">
+              <a:lnSpc>
+                <a:spcPct val="100000"/>
+              </a:lnSpc>
+              <a:spcBef>
+                <a:spcPct val="30000"/>
+              </a:spcBef>
+              <a:spcAft>
+                <a:spcPct val="0"/>
+              </a:spcAft>
+              <a:buSzPct val="85000"/>
+              <a:buFont typeface="Arial" panose="020B0604020202020204" pitchFamily="34" charset="0"/>
+              <a:buChar char="•"/>
+              <a:defRPr sz="2800" b="0" i="0" cap="none" baseline="0">
+                <a:solidFill>
+                  <a:schemeClr val="tx1"/>
+                </a:solidFill>
+                <a:latin typeface="Open Sans Light" panose="020B0606030504020204" pitchFamily="34" charset="0"/>
+                <a:ea typeface="Open Sans Light" panose="020B0606030504020204" pitchFamily="34" charset="0"/>
+                <a:cs typeface="Open Sans Light" panose="020B0606030504020204" pitchFamily="34" charset="0"/>
+              </a:defRPr>
+            </a:lvl2pPr>
+            <a:lvl3pPr marL="482192" indent="-96439" algn="l" rtl="0" eaLnBrk="1" fontAlgn="base" hangingPunct="1">
+              <a:lnSpc>
+                <a:spcPct val="100000"/>
+              </a:lnSpc>
+              <a:spcBef>
+                <a:spcPct val="30000"/>
+              </a:spcBef>
+              <a:spcAft>
+                <a:spcPct val="0"/>
+              </a:spcAft>
+              <a:buSzPct val="85000"/>
+              <a:buFont typeface="Arial" panose="020B0604020202020204" pitchFamily="34" charset="0"/>
+              <a:buChar char="•"/>
+              <a:defRPr sz="2400" b="0" i="0" cap="none" baseline="0">
+                <a:solidFill>
+                  <a:schemeClr val="tx1"/>
+                </a:solidFill>
+                <a:latin typeface="Open Sans Light" panose="020B0606030504020204" pitchFamily="34" charset="0"/>
+                <a:ea typeface="Open Sans Light" panose="020B0606030504020204" pitchFamily="34" charset="0"/>
+                <a:cs typeface="Open Sans Light" panose="020B0606030504020204" pitchFamily="34" charset="0"/>
+              </a:defRPr>
+            </a:lvl3pPr>
+            <a:lvl4pPr marL="650958" indent="-72329" algn="l" rtl="0" eaLnBrk="1" fontAlgn="base" hangingPunct="1">
+              <a:lnSpc>
+                <a:spcPct val="100000"/>
+              </a:lnSpc>
+              <a:spcBef>
+                <a:spcPct val="30000"/>
+              </a:spcBef>
+              <a:spcAft>
+                <a:spcPct val="0"/>
+              </a:spcAft>
+              <a:buSzPct val="85000"/>
+              <a:buFont typeface="Arial" panose="020B0604020202020204" pitchFamily="34" charset="0"/>
+              <a:buChar char="•"/>
+              <a:defRPr sz="2400" b="0" i="0" cap="none" baseline="0">
+                <a:solidFill>
+                  <a:schemeClr val="tx1"/>
+                </a:solidFill>
+                <a:latin typeface="Open Sans Light" panose="020B0606030504020204" pitchFamily="34" charset="0"/>
+                <a:ea typeface="Open Sans Light" panose="020B0606030504020204" pitchFamily="34" charset="0"/>
+                <a:cs typeface="Open Sans Light" panose="020B0606030504020204" pitchFamily="34" charset="0"/>
+              </a:defRPr>
+            </a:lvl4pPr>
+            <a:lvl5pPr marL="843835" indent="-72329" algn="l" rtl="0" eaLnBrk="1" fontAlgn="base" hangingPunct="1">
+              <a:lnSpc>
+                <a:spcPct val="100000"/>
+              </a:lnSpc>
+              <a:spcBef>
+                <a:spcPct val="30000"/>
+              </a:spcBef>
+              <a:spcAft>
+                <a:spcPct val="0"/>
+              </a:spcAft>
+              <a:buSzPct val="85000"/>
+              <a:buFont typeface="Arial" panose="020B0604020202020204" pitchFamily="34" charset="0"/>
+              <a:buChar char="•"/>
+              <a:defRPr sz="2000" b="0" i="0" cap="none" baseline="0">
+                <a:solidFill>
+                  <a:schemeClr val="tx1"/>
+                </a:solidFill>
+                <a:latin typeface="Open Sans Light" panose="020B0606030504020204" pitchFamily="34" charset="0"/>
+                <a:ea typeface="Open Sans Light" panose="020B0606030504020204" pitchFamily="34" charset="0"/>
+                <a:cs typeface="Open Sans Light" panose="020B0606030504020204" pitchFamily="34" charset="0"/>
+              </a:defRPr>
+            </a:lvl5pPr>
+            <a:lvl6pPr marL="1036711" indent="-72329" algn="l" rtl="0" eaLnBrk="1" fontAlgn="base" hangingPunct="1">
+              <a:lnSpc>
+                <a:spcPct val="90000"/>
+              </a:lnSpc>
+              <a:spcBef>
+                <a:spcPct val="30000"/>
+              </a:spcBef>
+              <a:spcAft>
+                <a:spcPct val="0"/>
+              </a:spcAft>
+              <a:buSzPct val="100000"/>
+              <a:buChar char="–"/>
+              <a:defRPr sz="591" b="1">
+                <a:solidFill>
+                  <a:schemeClr val="tx1"/>
+                </a:solidFill>
+                <a:latin typeface="+mn-lt"/>
+                <a:ea typeface="ＭＳ Ｐゴシック" charset="-128"/>
+              </a:defRPr>
+            </a:lvl6pPr>
+            <a:lvl7pPr marL="1229588" indent="-72329" algn="l" rtl="0" eaLnBrk="1" fontAlgn="base" hangingPunct="1">
+              <a:lnSpc>
+                <a:spcPct val="90000"/>
+              </a:lnSpc>
+              <a:spcBef>
+                <a:spcPct val="30000"/>
+              </a:spcBef>
+              <a:spcAft>
+                <a:spcPct val="0"/>
+              </a:spcAft>
+              <a:buSzPct val="100000"/>
+              <a:buChar char="–"/>
+              <a:defRPr sz="591" b="1">
+                <a:solidFill>
+                  <a:schemeClr val="tx1"/>
+                </a:solidFill>
+                <a:latin typeface="+mn-lt"/>
+                <a:ea typeface="ＭＳ Ｐゴシック" charset="-128"/>
+              </a:defRPr>
+            </a:lvl7pPr>
+            <a:lvl8pPr marL="1422464" indent="-72329" algn="l" rtl="0" eaLnBrk="1" fontAlgn="base" hangingPunct="1">
+              <a:lnSpc>
+                <a:spcPct val="90000"/>
+              </a:lnSpc>
+              <a:spcBef>
+                <a:spcPct val="30000"/>
+              </a:spcBef>
+              <a:spcAft>
+                <a:spcPct val="0"/>
+              </a:spcAft>
+              <a:buSzPct val="100000"/>
+              <a:buChar char="–"/>
+              <a:defRPr sz="591" b="1">
+                <a:solidFill>
+                  <a:schemeClr val="tx1"/>
+                </a:solidFill>
+                <a:latin typeface="+mn-lt"/>
+                <a:ea typeface="ＭＳ Ｐゴシック" charset="-128"/>
+              </a:defRPr>
+            </a:lvl8pPr>
+            <a:lvl9pPr marL="1615341" indent="-72329" algn="l" rtl="0" eaLnBrk="1" fontAlgn="base" hangingPunct="1">
+              <a:lnSpc>
+                <a:spcPct val="90000"/>
+              </a:lnSpc>
+              <a:spcBef>
+                <a:spcPct val="30000"/>
+              </a:spcBef>
+              <a:spcAft>
+                <a:spcPct val="0"/>
+              </a:spcAft>
+              <a:buSzPct val="100000"/>
+              <a:buChar char="–"/>
+              <a:defRPr sz="591" b="1">
+                <a:solidFill>
+                  <a:schemeClr val="tx1"/>
+                </a:solidFill>
+                <a:latin typeface="+mn-lt"/>
+                <a:ea typeface="ＭＳ Ｐゴシック" charset="-128"/>
+              </a:defRPr>
+            </a:lvl9pPr>
+          </a:lstStyle>
+          <a:p>
+            <a:pPr>
+              <a:buClrTx/>
+            </a:pPr>
+            <a:r>
+              <a:rPr lang="en-US" sz="1000" dirty="0"/>
+              <a:t>Rev1: 2024-07-03 2:15 PM PST</a:t>
+            </a:r>
+          </a:p>
+        </p:txBody>
+      </p:sp>
     </p:spTree>
     <p:extLst>
       <p:ext uri="{BB962C8B-B14F-4D97-AF65-F5344CB8AC3E}">
@@ -15955,6 +16213,27 @@
                 <a:cs typeface="Open Sans Light" pitchFamily="2" charset="0"/>
               </a:rPr>
               <a:t> of July)</a:t>
+            </a:r>
+          </a:p>
+          <a:p>
+            <a:r>
+              <a:rPr lang="en-US" dirty="0">
+                <a:latin typeface="Open Sans Light" pitchFamily="2" charset="0"/>
+                <a:ea typeface="Open Sans Light" pitchFamily="2" charset="0"/>
+                <a:cs typeface="Open Sans Light" pitchFamily="2" charset="0"/>
+              </a:rPr>
+              <a:t> HW05, Lab05 will be released tomorrow (Due: 7/10)</a:t>
+            </a:r>
+          </a:p>
+          <a:p>
+            <a:pPr lvl="1"/>
+            <a:r>
+              <a:rPr lang="en-US" dirty="0">
+                <a:latin typeface="Open Sans Light" pitchFamily="2" charset="0"/>
+                <a:ea typeface="Open Sans Light" pitchFamily="2" charset="0"/>
+                <a:cs typeface="Open Sans Light" pitchFamily="2" charset="0"/>
+              </a:rPr>
+              <a:t> (Due date is +2 days due to the holiday)</a:t>
             </a:r>
           </a:p>
         </p:txBody>
@@ -24096,7 +24375,79 @@
                 <a:ea typeface="Open Sans Light" pitchFamily="2" charset="0"/>
                 <a:cs typeface="Open Sans Light" pitchFamily="2" charset="0"/>
               </a:rPr>
+              <a:t> </a:t>
+            </a:r>
+            <a:r>
+              <a:rPr lang="en-US" b="1" dirty="0">
+                <a:latin typeface="Open Sans Light" pitchFamily="2" charset="0"/>
+                <a:ea typeface="Open Sans Light" pitchFamily="2" charset="0"/>
+                <a:cs typeface="Open Sans Light" pitchFamily="2" charset="0"/>
+              </a:rPr>
+              <a:t>It is required that every student fill this out.</a:t>
+            </a:r>
+          </a:p>
+          <a:p>
+            <a:pPr lvl="2"/>
+            <a:r>
+              <a:rPr lang="en-US" b="1" dirty="0">
+                <a:latin typeface="Open Sans Light" pitchFamily="2" charset="0"/>
+                <a:ea typeface="Open Sans Light" pitchFamily="2" charset="0"/>
+                <a:cs typeface="Open Sans Light" pitchFamily="2" charset="0"/>
+              </a:rPr>
               <a:t> Please, please do this ASAP! Thank you!</a:t>
+            </a:r>
+          </a:p>
+          <a:p>
+            <a:r>
+              <a:rPr lang="en-US" dirty="0">
+                <a:latin typeface="Open Sans Light" pitchFamily="2" charset="0"/>
+                <a:ea typeface="Open Sans Light" pitchFamily="2" charset="0"/>
+                <a:cs typeface="Open Sans Light" pitchFamily="2" charset="0"/>
+              </a:rPr>
+              <a:t> </a:t>
+            </a:r>
+            <a:r>
+              <a:rPr lang="en-US" b="1" dirty="0">
+                <a:latin typeface="Open Sans Light" pitchFamily="2" charset="0"/>
+                <a:ea typeface="Open Sans Light" pitchFamily="2" charset="0"/>
+                <a:cs typeface="Open Sans Light" pitchFamily="2" charset="0"/>
+              </a:rPr>
+              <a:t>(DSP students with +50% exam time)</a:t>
+            </a:r>
+            <a:r>
+              <a:rPr lang="en-US" dirty="0">
+                <a:latin typeface="Open Sans Light" pitchFamily="2" charset="0"/>
+                <a:ea typeface="Open Sans Light" pitchFamily="2" charset="0"/>
+                <a:cs typeface="Open Sans Light" pitchFamily="2" charset="0"/>
+              </a:rPr>
+              <a:t> Keep an eye out for a separate Google Form to schedule your midterm</a:t>
+            </a:r>
+          </a:p>
+          <a:p>
+            <a:pPr lvl="1"/>
+            <a:r>
+              <a:rPr lang="en-US" dirty="0">
+                <a:latin typeface="Open Sans Light" pitchFamily="2" charset="0"/>
+                <a:ea typeface="Open Sans Light" pitchFamily="2" charset="0"/>
+                <a:cs typeface="Open Sans Light" pitchFamily="2" charset="0"/>
+              </a:rPr>
+              <a:t> But, you should still fill out the above </a:t>
+            </a:r>
+            <a:r>
+              <a:rPr lang="en-US" dirty="0" err="1">
+                <a:latin typeface="Open Sans Light" pitchFamily="2" charset="0"/>
+                <a:ea typeface="Open Sans Light" pitchFamily="2" charset="0"/>
+                <a:cs typeface="Open Sans Light" pitchFamily="2" charset="0"/>
+              </a:rPr>
+              <a:t>Gradescope</a:t>
+            </a:r>
+            <a:r>
+              <a:rPr lang="en-US" dirty="0">
+                <a:latin typeface="Open Sans Light" pitchFamily="2" charset="0"/>
+                <a:ea typeface="Open Sans Light" pitchFamily="2" charset="0"/>
+                <a:cs typeface="Open Sans Light" pitchFamily="2" charset="0"/>
+              </a:rPr>
+              <a:t> “Midterm Exam Scheduling” form as well!</a:t>
             </a:r>
           </a:p>
           <a:p>
@@ -31050,6 +31401,13 @@
           <a:bodyPr/>
           <a:lstStyle/>
           <a:p>
+            <a:r>
+              <a:rPr lang="en-US" dirty="0"/>
+              <a:t>Mutable functions</a:t>
+            </a:r>
+            <a:br>
+              <a:rPr lang="en-US" dirty="0"/>
+            </a:br>
             <a:r>
               <a:rPr lang="en-US" dirty="0"/>
               <a:t>(Leftover slides from yesterday)</a:t>

</xml_diff>